<commit_message>
Change order of slides
</commit_message>
<xml_diff>
--- a/Dokumenty/Prezentacja.pptx
+++ b/Dokumenty/Prezentacja.pptx
@@ -12,10 +12,10 @@
     <p:sldId id="256" r:id="rId3"/>
     <p:sldId id="257" r:id="rId4"/>
     <p:sldId id="258" r:id="rId5"/>
-    <p:sldId id="283" r:id="rId6"/>
-    <p:sldId id="259" r:id="rId7"/>
-    <p:sldId id="285" r:id="rId8"/>
-    <p:sldId id="292" r:id="rId9"/>
+    <p:sldId id="259" r:id="rId6"/>
+    <p:sldId id="285" r:id="rId7"/>
+    <p:sldId id="292" r:id="rId8"/>
+    <p:sldId id="283" r:id="rId9"/>
     <p:sldId id="264" r:id="rId10"/>
     <p:sldId id="265" r:id="rId11"/>
     <p:sldId id="270" r:id="rId12"/>
@@ -3146,7 +3146,7 @@
       </p:grpSpPr>
       <p:sp>
         <p:nvSpPr>
-          <p:cNvPr id="251" name="PlaceHolder 1"/>
+          <p:cNvPr id="254" name="PlaceHolder 1"/>
           <p:cNvSpPr>
             <a:spLocks noGrp="1"/>
           </p:cNvSpPr>
@@ -3183,7 +3183,7 @@
       </p:sp>
       <p:sp>
         <p:nvSpPr>
-          <p:cNvPr id="252" name="TextShape 2"/>
+          <p:cNvPr id="255" name="TextShape 2"/>
           <p:cNvSpPr txBox="1"/>
           <p:nvPr/>
         </p:nvSpPr>
@@ -3209,7 +3209,7 @@
                 <a:spcPct val="100000"/>
               </a:lnSpc>
             </a:pPr>
-            <a:fld id="{33AFFB65-98B1-46A7-97A7-2D930BE7B4F0}" type="slidenum">
+            <a:fld id="{83293B72-7F64-49C5-99B7-E09A40F5DA7B}" type="slidenum">
               <a:rPr lang="en-US" sz="1200" b="0" strike="noStrike" spc="-1">
                 <a:solidFill>
                   <a:srgbClr val="000000"/>
@@ -3240,7 +3240,7 @@
       </p:sp>
       <p:sp>
         <p:nvSpPr>
-          <p:cNvPr id="253" name="TextShape 3"/>
+          <p:cNvPr id="256" name="TextShape 3"/>
           <p:cNvSpPr txBox="1"/>
           <p:nvPr/>
         </p:nvSpPr>
@@ -3276,11 +3276,6 @@
         </p:txBody>
       </p:sp>
     </p:spTree>
-    <p:extLst>
-      <p:ext uri="{BB962C8B-B14F-4D97-AF65-F5344CB8AC3E}">
-        <p14:creationId xmlns:p14="http://schemas.microsoft.com/office/powerpoint/2010/main" val="2162846887"/>
-      </p:ext>
-    </p:extLst>
   </p:cSld>
   <p:clrMapOvr>
     <a:masterClrMapping/>
@@ -3437,6 +3432,11 @@
         </p:txBody>
       </p:sp>
     </p:spTree>
+    <p:extLst>
+      <p:ext uri="{BB962C8B-B14F-4D97-AF65-F5344CB8AC3E}">
+        <p14:creationId xmlns:p14="http://schemas.microsoft.com/office/powerpoint/2010/main" val="3195280035"/>
+      </p:ext>
+    </p:extLst>
   </p:cSld>
   <p:clrMapOvr>
     <a:masterClrMapping/>
@@ -3595,7 +3595,7 @@
     </p:spTree>
     <p:extLst>
       <p:ext uri="{BB962C8B-B14F-4D97-AF65-F5344CB8AC3E}">
-        <p14:creationId xmlns:p14="http://schemas.microsoft.com/office/powerpoint/2010/main" val="3195280035"/>
+        <p14:creationId xmlns:p14="http://schemas.microsoft.com/office/powerpoint/2010/main" val="3342817023"/>
       </p:ext>
     </p:extLst>
   </p:cSld>
@@ -3624,7 +3624,7 @@
       </p:grpSpPr>
       <p:sp>
         <p:nvSpPr>
-          <p:cNvPr id="254" name="PlaceHolder 1"/>
+          <p:cNvPr id="251" name="PlaceHolder 1"/>
           <p:cNvSpPr>
             <a:spLocks noGrp="1"/>
           </p:cNvSpPr>
@@ -3661,7 +3661,7 @@
       </p:sp>
       <p:sp>
         <p:nvSpPr>
-          <p:cNvPr id="255" name="TextShape 2"/>
+          <p:cNvPr id="252" name="TextShape 2"/>
           <p:cNvSpPr txBox="1"/>
           <p:nvPr/>
         </p:nvSpPr>
@@ -3687,7 +3687,7 @@
                 <a:spcPct val="100000"/>
               </a:lnSpc>
             </a:pPr>
-            <a:fld id="{83293B72-7F64-49C5-99B7-E09A40F5DA7B}" type="slidenum">
+            <a:fld id="{33AFFB65-98B1-46A7-97A7-2D930BE7B4F0}" type="slidenum">
               <a:rPr lang="en-US" sz="1200" b="0" strike="noStrike" spc="-1">
                 <a:solidFill>
                   <a:srgbClr val="000000"/>
@@ -3718,7 +3718,7 @@
       </p:sp>
       <p:sp>
         <p:nvSpPr>
-          <p:cNvPr id="256" name="TextShape 3"/>
+          <p:cNvPr id="253" name="TextShape 3"/>
           <p:cNvSpPr txBox="1"/>
           <p:nvPr/>
         </p:nvSpPr>
@@ -3756,7 +3756,7 @@
     </p:spTree>
     <p:extLst>
       <p:ext uri="{BB962C8B-B14F-4D97-AF65-F5344CB8AC3E}">
-        <p14:creationId xmlns:p14="http://schemas.microsoft.com/office/powerpoint/2010/main" val="3342817023"/>
+        <p14:creationId xmlns:p14="http://schemas.microsoft.com/office/powerpoint/2010/main" val="2162846887"/>
       </p:ext>
     </p:extLst>
   </p:cSld>
@@ -22558,7 +22558,7 @@
       </p:grpSpPr>
       <p:sp>
         <p:nvSpPr>
-          <p:cNvPr id="104" name="CustomShape 1"/>
+          <p:cNvPr id="110" name="CustomShape 1"/>
           <p:cNvSpPr/>
           <p:nvPr/>
         </p:nvSpPr>
@@ -22627,14 +22627,14 @@
       </p:sp>
       <p:sp>
         <p:nvSpPr>
-          <p:cNvPr id="105" name="TextShape 2"/>
+          <p:cNvPr id="111" name="TextShape 2"/>
           <p:cNvSpPr txBox="1"/>
           <p:nvPr/>
         </p:nvSpPr>
         <p:spPr>
           <a:xfrm>
-            <a:off x="298440" y="586710"/>
-            <a:ext cx="8229240" cy="781560"/>
+            <a:off x="298440" y="529560"/>
+            <a:ext cx="8229240" cy="939240"/>
           </a:xfrm>
           <a:prstGeom prst="rect">
             <a:avLst/>
@@ -22654,7 +22654,7 @@
               </a:lnSpc>
             </a:pPr>
             <a:r>
-              <a:rPr lang="pl-PL" sz="2800" b="1" strike="noStrike" spc="-1" dirty="0">
+              <a:rPr lang="en-US" sz="2800" b="1" strike="noStrike" spc="-1" dirty="0" err="1">
                 <a:solidFill>
                   <a:srgbClr val="000000"/>
                 </a:solidFill>
@@ -22666,7 +22666,7 @@
                 <a:latin typeface="Cambria" panose="02040503050406030204" pitchFamily="18" charset="0"/>
                 <a:ea typeface="Verdana"/>
               </a:rPr>
-              <a:t>Warsztat</a:t>
+              <a:t>Aplikacja</a:t>
             </a:r>
             <a:endParaRPr lang="en-US" sz="1400" b="0" strike="noStrike" spc="-1" dirty="0">
               <a:solidFill>
@@ -22684,7 +22684,7 @@
       </p:sp>
       <p:sp>
         <p:nvSpPr>
-          <p:cNvPr id="106" name="CustomShape 3"/>
+          <p:cNvPr id="112" name="CustomShape 3"/>
           <p:cNvSpPr/>
           <p:nvPr/>
         </p:nvSpPr>
@@ -22716,7 +22716,7 @@
       </p:sp>
       <p:sp>
         <p:nvSpPr>
-          <p:cNvPr id="107" name="CustomShape 4"/>
+          <p:cNvPr id="113" name="CustomShape 4"/>
           <p:cNvSpPr/>
           <p:nvPr/>
         </p:nvSpPr>
@@ -22765,7 +22765,7 @@
       </p:sp>
       <p:sp>
         <p:nvSpPr>
-          <p:cNvPr id="108" name="TextShape 5"/>
+          <p:cNvPr id="114" name="TextShape 5"/>
           <p:cNvSpPr txBox="1"/>
           <p:nvPr/>
         </p:nvSpPr>
@@ -22791,7 +22791,7 @@
                 <a:spcPct val="100000"/>
               </a:lnSpc>
             </a:pPr>
-            <a:fld id="{51713E7D-C8CA-401A-8373-A373C6BBA71F}" type="slidenum">
+            <a:fld id="{E34A91E5-5D13-4E68-AD83-7376D0DD3D32}" type="slidenum">
               <a:rPr lang="en-US" sz="1200" b="0" strike="noStrike" spc="-1">
                 <a:solidFill>
                   <a:srgbClr val="888888"/>
@@ -22820,234 +22820,7 @@
           </a:p>
         </p:txBody>
       </p:sp>
-      <p:sp>
-        <p:nvSpPr>
-          <p:cNvPr id="109" name="CustomShape 6"/>
-          <p:cNvSpPr/>
-          <p:nvPr/>
-        </p:nvSpPr>
-        <p:spPr>
-          <a:xfrm>
-            <a:off x="473040" y="1413510"/>
-            <a:ext cx="8443800" cy="2213610"/>
-          </a:xfrm>
-          <a:prstGeom prst="rect">
-            <a:avLst/>
-          </a:prstGeom>
-          <a:noFill/>
-          <a:ln>
-            <a:noFill/>
-          </a:ln>
-        </p:spPr>
-        <p:style>
-          <a:lnRef idx="0">
-            <a:scrgbClr r="0" g="0" b="0"/>
-          </a:lnRef>
-          <a:fillRef idx="0">
-            <a:scrgbClr r="0" g="0" b="0"/>
-          </a:fillRef>
-          <a:effectRef idx="0">
-            <a:scrgbClr r="0" g="0" b="0"/>
-          </a:effectRef>
-          <a:fontRef idx="minor"/>
-        </p:style>
-        <p:txBody>
-          <a:bodyPr/>
-          <a:lstStyle/>
-          <a:p>
-            <a:pPr>
-              <a:lnSpc>
-                <a:spcPct val="100000"/>
-              </a:lnSpc>
-            </a:pPr>
-            <a:r>
-              <a:rPr lang="pl-PL" sz="1700" spc="-1" dirty="0">
-                <a:solidFill>
-                  <a:srgbClr val="000000"/>
-                </a:solidFill>
-                <a:uFill>
-                  <a:solidFill>
-                    <a:srgbClr val="FFFFFF"/>
-                  </a:solidFill>
-                </a:uFill>
-                <a:latin typeface="Calibri" panose="020F0502020204030204" pitchFamily="34" charset="0"/>
-                <a:ea typeface="Verdana"/>
-                <a:cs typeface="Calibri" panose="020F0502020204030204" pitchFamily="34" charset="0"/>
-              </a:rPr>
-              <a:t>Czyli z czym będziemy dziś pracować</a:t>
-            </a:r>
-          </a:p>
-          <a:p>
-            <a:pPr>
-              <a:lnSpc>
-                <a:spcPct val="100000"/>
-              </a:lnSpc>
-            </a:pPr>
-            <a:endParaRPr lang="pl-PL" sz="1700" spc="-1" dirty="0">
-              <a:solidFill>
-                <a:srgbClr val="000000"/>
-              </a:solidFill>
-              <a:uFill>
-                <a:solidFill>
-                  <a:srgbClr val="FFFFFF"/>
-                </a:solidFill>
-              </a:uFill>
-              <a:latin typeface="Calibri" panose="020F0502020204030204" pitchFamily="34" charset="0"/>
-              <a:ea typeface="Verdana"/>
-              <a:cs typeface="Calibri" panose="020F0502020204030204" pitchFamily="34" charset="0"/>
-            </a:endParaRPr>
-          </a:p>
-          <a:p>
-            <a:pPr>
-              <a:lnSpc>
-                <a:spcPct val="100000"/>
-              </a:lnSpc>
-            </a:pPr>
-            <a:r>
-              <a:rPr lang="pl-PL" sz="1700" spc="-1" dirty="0">
-                <a:solidFill>
-                  <a:srgbClr val="000000"/>
-                </a:solidFill>
-                <a:uFill>
-                  <a:solidFill>
-                    <a:srgbClr val="FFFFFF"/>
-                  </a:solidFill>
-                </a:uFill>
-                <a:latin typeface="Calibri" panose="020F0502020204030204" pitchFamily="34" charset="0"/>
-                <a:ea typeface="Verdana"/>
-                <a:cs typeface="Calibri" panose="020F0502020204030204" pitchFamily="34" charset="0"/>
-              </a:rPr>
-              <a:t>Android</a:t>
-            </a:r>
-          </a:p>
-          <a:p>
-            <a:pPr>
-              <a:lnSpc>
-                <a:spcPct val="100000"/>
-              </a:lnSpc>
-            </a:pPr>
-            <a:r>
-              <a:rPr lang="pl-PL" sz="1700" spc="-1" dirty="0">
-                <a:solidFill>
-                  <a:srgbClr val="000000"/>
-                </a:solidFill>
-                <a:uFill>
-                  <a:solidFill>
-                    <a:srgbClr val="FFFFFF"/>
-                  </a:solidFill>
-                </a:uFill>
-                <a:latin typeface="Calibri" panose="020F0502020204030204" pitchFamily="34" charset="0"/>
-                <a:ea typeface="Verdana"/>
-                <a:cs typeface="Calibri" panose="020F0502020204030204" pitchFamily="34" charset="0"/>
-              </a:rPr>
-              <a:t>Espresso</a:t>
-            </a:r>
-          </a:p>
-          <a:p>
-            <a:pPr>
-              <a:lnSpc>
-                <a:spcPct val="100000"/>
-              </a:lnSpc>
-            </a:pPr>
-            <a:r>
-              <a:rPr lang="pl-PL" sz="1700" spc="-1" dirty="0" err="1">
-                <a:solidFill>
-                  <a:srgbClr val="000000"/>
-                </a:solidFill>
-                <a:uFill>
-                  <a:solidFill>
-                    <a:srgbClr val="FFFFFF"/>
-                  </a:solidFill>
-                </a:uFill>
-                <a:latin typeface="Calibri" panose="020F0502020204030204" pitchFamily="34" charset="0"/>
-                <a:ea typeface="Verdana"/>
-                <a:cs typeface="Calibri" panose="020F0502020204030204" pitchFamily="34" charset="0"/>
-              </a:rPr>
-              <a:t>JUnit</a:t>
-            </a:r>
-            <a:endParaRPr lang="pl-PL" sz="1700" spc="-1" dirty="0">
-              <a:solidFill>
-                <a:srgbClr val="000000"/>
-              </a:solidFill>
-              <a:uFill>
-                <a:solidFill>
-                  <a:srgbClr val="FFFFFF"/>
-                </a:solidFill>
-              </a:uFill>
-              <a:latin typeface="Calibri" panose="020F0502020204030204" pitchFamily="34" charset="0"/>
-              <a:ea typeface="Verdana"/>
-              <a:cs typeface="Calibri" panose="020F0502020204030204" pitchFamily="34" charset="0"/>
-            </a:endParaRPr>
-          </a:p>
-          <a:p>
-            <a:pPr>
-              <a:lnSpc>
-                <a:spcPct val="100000"/>
-              </a:lnSpc>
-            </a:pPr>
-            <a:r>
-              <a:rPr lang="pl-PL" sz="1700" spc="-1" dirty="0">
-                <a:solidFill>
-                  <a:srgbClr val="000000"/>
-                </a:solidFill>
-                <a:uFill>
-                  <a:solidFill>
-                    <a:srgbClr val="FFFFFF"/>
-                  </a:solidFill>
-                </a:uFill>
-                <a:latin typeface="Calibri" panose="020F0502020204030204" pitchFamily="34" charset="0"/>
-                <a:ea typeface="Verdana"/>
-                <a:cs typeface="Calibri" panose="020F0502020204030204" pitchFamily="34" charset="0"/>
-              </a:rPr>
-              <a:t>Java</a:t>
-            </a:r>
-          </a:p>
-          <a:p>
-            <a:r>
-              <a:rPr lang="pl-PL" sz="1700" spc="-1" dirty="0">
-                <a:solidFill>
-                  <a:srgbClr val="000000"/>
-                </a:solidFill>
-                <a:uFill>
-                  <a:solidFill>
-                    <a:srgbClr val="FFFFFF"/>
-                  </a:solidFill>
-                </a:uFill>
-                <a:latin typeface="Calibri" panose="020F0502020204030204" pitchFamily="34" charset="0"/>
-                <a:ea typeface="Verdana"/>
-                <a:cs typeface="Calibri" panose="020F0502020204030204" pitchFamily="34" charset="0"/>
-              </a:rPr>
-              <a:t>Android Studio</a:t>
-            </a:r>
-          </a:p>
-          <a:p>
-            <a:pPr>
-              <a:lnSpc>
-                <a:spcPct val="100000"/>
-              </a:lnSpc>
-            </a:pPr>
-            <a:endParaRPr lang="pl-PL" sz="1700" spc="-1" dirty="0">
-              <a:solidFill>
-                <a:srgbClr val="000000"/>
-              </a:solidFill>
-              <a:uFill>
-                <a:solidFill>
-                  <a:srgbClr val="FFFFFF"/>
-                </a:solidFill>
-              </a:uFill>
-              <a:latin typeface="Calibri" panose="020F0502020204030204" pitchFamily="34" charset="0"/>
-              <a:ea typeface="Verdana"/>
-              <a:cs typeface="Calibri" panose="020F0502020204030204" pitchFamily="34" charset="0"/>
-            </a:endParaRPr>
-          </a:p>
-        </p:txBody>
-      </p:sp>
     </p:spTree>
-    <p:extLst>
-      <p:ext uri="{BB962C8B-B14F-4D97-AF65-F5344CB8AC3E}">
-        <p14:creationId xmlns:p14="http://schemas.microsoft.com/office/powerpoint/2010/main" val="2083186259"/>
-      </p:ext>
-    </p:extLst>
   </p:cSld>
   <p:clrMapOvr>
     <a:masterClrMapping/>
@@ -23336,7 +23109,43 @@
           </a:p>
         </p:txBody>
       </p:sp>
+      <p:pic>
+        <p:nvPicPr>
+          <p:cNvPr id="115" name="Shape 137"/>
+          <p:cNvPicPr/>
+          <p:nvPr/>
+        </p:nvPicPr>
+        <p:blipFill>
+          <a:blip r:embed="rId3">
+            <a:extLst>
+              <a:ext uri="{28A0092B-C50C-407E-A947-70E740481C1C}">
+                <a14:useLocalDpi xmlns:a14="http://schemas.microsoft.com/office/drawing/2010/main" val="0"/>
+              </a:ext>
+            </a:extLst>
+          </a:blip>
+          <a:stretch>
+            <a:fillRect/>
+          </a:stretch>
+        </p:blipFill>
+        <p:spPr>
+          <a:xfrm>
+            <a:off x="2513115" y="447120"/>
+            <a:ext cx="2453490" cy="4361760"/>
+          </a:xfrm>
+          <a:prstGeom prst="rect">
+            <a:avLst/>
+          </a:prstGeom>
+          <a:ln>
+            <a:noFill/>
+          </a:ln>
+        </p:spPr>
+      </p:pic>
     </p:spTree>
+    <p:extLst>
+      <p:ext uri="{BB962C8B-B14F-4D97-AF65-F5344CB8AC3E}">
+        <p14:creationId xmlns:p14="http://schemas.microsoft.com/office/powerpoint/2010/main" val="1592213292"/>
+      </p:ext>
+    </p:extLst>
   </p:cSld>
   <p:clrMapOvr>
     <a:masterClrMapping/>
@@ -23656,10 +23465,41 @@
           </a:ln>
         </p:spPr>
       </p:pic>
+      <p:pic>
+        <p:nvPicPr>
+          <p:cNvPr id="116" name="Shape 138"/>
+          <p:cNvPicPr/>
+          <p:nvPr/>
+        </p:nvPicPr>
+        <p:blipFill>
+          <a:blip r:embed="rId4">
+            <a:extLst>
+              <a:ext uri="{28A0092B-C50C-407E-A947-70E740481C1C}">
+                <a14:useLocalDpi xmlns:a14="http://schemas.microsoft.com/office/drawing/2010/main" val="0"/>
+              </a:ext>
+            </a:extLst>
+          </a:blip>
+          <a:stretch>
+            <a:fillRect/>
+          </a:stretch>
+        </p:blipFill>
+        <p:spPr>
+          <a:xfrm>
+            <a:off x="5561235" y="447120"/>
+            <a:ext cx="2453490" cy="4361760"/>
+          </a:xfrm>
+          <a:prstGeom prst="rect">
+            <a:avLst/>
+          </a:prstGeom>
+          <a:ln>
+            <a:noFill/>
+          </a:ln>
+        </p:spPr>
+      </p:pic>
     </p:spTree>
     <p:extLst>
       <p:ext uri="{BB962C8B-B14F-4D97-AF65-F5344CB8AC3E}">
-        <p14:creationId xmlns:p14="http://schemas.microsoft.com/office/powerpoint/2010/main" val="1592213292"/>
+        <p14:creationId xmlns:p14="http://schemas.microsoft.com/office/powerpoint/2010/main" val="2294709877"/>
       </p:ext>
     </p:extLst>
   </p:cSld>
@@ -23688,7 +23528,7 @@
       </p:grpSpPr>
       <p:sp>
         <p:nvSpPr>
-          <p:cNvPr id="110" name="CustomShape 1"/>
+          <p:cNvPr id="104" name="CustomShape 1"/>
           <p:cNvSpPr/>
           <p:nvPr/>
         </p:nvSpPr>
@@ -23757,14 +23597,14 @@
       </p:sp>
       <p:sp>
         <p:nvSpPr>
-          <p:cNvPr id="111" name="TextShape 2"/>
+          <p:cNvPr id="105" name="TextShape 2"/>
           <p:cNvSpPr txBox="1"/>
           <p:nvPr/>
         </p:nvSpPr>
         <p:spPr>
           <a:xfrm>
-            <a:off x="298440" y="529560"/>
-            <a:ext cx="8229240" cy="939240"/>
+            <a:off x="298440" y="586710"/>
+            <a:ext cx="8229240" cy="781560"/>
           </a:xfrm>
           <a:prstGeom prst="rect">
             <a:avLst/>
@@ -23784,7 +23624,7 @@
               </a:lnSpc>
             </a:pPr>
             <a:r>
-              <a:rPr lang="en-US" sz="2800" b="1" strike="noStrike" spc="-1" dirty="0" err="1">
+              <a:rPr lang="pl-PL" sz="2800" b="1" strike="noStrike" spc="-1" dirty="0">
                 <a:solidFill>
                   <a:srgbClr val="000000"/>
                 </a:solidFill>
@@ -23796,7 +23636,7 @@
                 <a:latin typeface="Cambria" panose="02040503050406030204" pitchFamily="18" charset="0"/>
                 <a:ea typeface="Verdana"/>
               </a:rPr>
-              <a:t>Aplikacja</a:t>
+              <a:t>Warsztat</a:t>
             </a:r>
             <a:endParaRPr lang="en-US" sz="1400" b="0" strike="noStrike" spc="-1" dirty="0">
               <a:solidFill>
@@ -23814,7 +23654,7 @@
       </p:sp>
       <p:sp>
         <p:nvSpPr>
-          <p:cNvPr id="112" name="CustomShape 3"/>
+          <p:cNvPr id="106" name="CustomShape 3"/>
           <p:cNvSpPr/>
           <p:nvPr/>
         </p:nvSpPr>
@@ -23846,7 +23686,7 @@
       </p:sp>
       <p:sp>
         <p:nvSpPr>
-          <p:cNvPr id="113" name="CustomShape 4"/>
+          <p:cNvPr id="107" name="CustomShape 4"/>
           <p:cNvSpPr/>
           <p:nvPr/>
         </p:nvSpPr>
@@ -23895,7 +23735,7 @@
       </p:sp>
       <p:sp>
         <p:nvSpPr>
-          <p:cNvPr id="114" name="TextShape 5"/>
+          <p:cNvPr id="108" name="TextShape 5"/>
           <p:cNvSpPr txBox="1"/>
           <p:nvPr/>
         </p:nvSpPr>
@@ -23921,7 +23761,7 @@
                 <a:spcPct val="100000"/>
               </a:lnSpc>
             </a:pPr>
-            <a:fld id="{E34A91E5-5D13-4E68-AD83-7376D0DD3D32}" type="slidenum">
+            <a:fld id="{51713E7D-C8CA-401A-8373-A373C6BBA71F}" type="slidenum">
               <a:rPr lang="en-US" sz="1200" b="0" strike="noStrike" spc="-1">
                 <a:solidFill>
                   <a:srgbClr val="888888"/>
@@ -23950,72 +23790,247 @@
           </a:p>
         </p:txBody>
       </p:sp>
-      <p:pic>
-        <p:nvPicPr>
-          <p:cNvPr id="115" name="Shape 137"/>
-          <p:cNvPicPr/>
+      <p:sp>
+        <p:nvSpPr>
+          <p:cNvPr id="109" name="CustomShape 6"/>
+          <p:cNvSpPr/>
           <p:nvPr/>
-        </p:nvPicPr>
-        <p:blipFill>
-          <a:blip r:embed="rId3">
-            <a:extLst>
-              <a:ext uri="{28A0092B-C50C-407E-A947-70E740481C1C}">
-                <a14:useLocalDpi xmlns:a14="http://schemas.microsoft.com/office/drawing/2010/main" val="0"/>
-              </a:ext>
-            </a:extLst>
-          </a:blip>
-          <a:stretch>
-            <a:fillRect/>
-          </a:stretch>
-        </p:blipFill>
-        <p:spPr>
-          <a:xfrm>
-            <a:off x="2513115" y="447120"/>
-            <a:ext cx="2453490" cy="4361760"/>
-          </a:xfrm>
-          <a:prstGeom prst="rect">
-            <a:avLst/>
-          </a:prstGeom>
+        </p:nvSpPr>
+        <p:spPr>
+          <a:xfrm>
+            <a:off x="349920" y="1583100"/>
+            <a:ext cx="8443800" cy="2213610"/>
+          </a:xfrm>
+          <a:prstGeom prst="rect">
+            <a:avLst/>
+          </a:prstGeom>
+          <a:noFill/>
           <a:ln>
             <a:noFill/>
           </a:ln>
         </p:spPr>
-      </p:pic>
-      <p:pic>
-        <p:nvPicPr>
-          <p:cNvPr id="116" name="Shape 138"/>
-          <p:cNvPicPr/>
-          <p:nvPr/>
-        </p:nvPicPr>
-        <p:blipFill>
-          <a:blip r:embed="rId4">
-            <a:extLst>
-              <a:ext uri="{28A0092B-C50C-407E-A947-70E740481C1C}">
-                <a14:useLocalDpi xmlns:a14="http://schemas.microsoft.com/office/drawing/2010/main" val="0"/>
-              </a:ext>
-            </a:extLst>
-          </a:blip>
-          <a:stretch>
-            <a:fillRect/>
-          </a:stretch>
-        </p:blipFill>
-        <p:spPr>
-          <a:xfrm>
-            <a:off x="5561235" y="447120"/>
-            <a:ext cx="2453490" cy="4361760"/>
-          </a:xfrm>
-          <a:prstGeom prst="rect">
-            <a:avLst/>
-          </a:prstGeom>
-          <a:ln>
-            <a:noFill/>
-          </a:ln>
-        </p:spPr>
-      </p:pic>
+        <p:style>
+          <a:lnRef idx="0">
+            <a:scrgbClr r="0" g="0" b="0"/>
+          </a:lnRef>
+          <a:fillRef idx="0">
+            <a:scrgbClr r="0" g="0" b="0"/>
+          </a:fillRef>
+          <a:effectRef idx="0">
+            <a:scrgbClr r="0" g="0" b="0"/>
+          </a:effectRef>
+          <a:fontRef idx="minor"/>
+        </p:style>
+        <p:txBody>
+          <a:bodyPr/>
+          <a:lstStyle/>
+          <a:p>
+            <a:pPr>
+              <a:lnSpc>
+                <a:spcPct val="100000"/>
+              </a:lnSpc>
+            </a:pPr>
+            <a:r>
+              <a:rPr lang="pl-PL" sz="1700" spc="-1" dirty="0">
+                <a:solidFill>
+                  <a:srgbClr val="000000"/>
+                </a:solidFill>
+                <a:uFill>
+                  <a:solidFill>
+                    <a:srgbClr val="FFFFFF"/>
+                  </a:solidFill>
+                </a:uFill>
+                <a:latin typeface="Calibri" panose="020F0502020204030204" pitchFamily="34" charset="0"/>
+                <a:ea typeface="Verdana"/>
+                <a:cs typeface="Calibri" panose="020F0502020204030204" pitchFamily="34" charset="0"/>
+              </a:rPr>
+              <a:t>Czyli z czym będziemy dziś pracować</a:t>
+            </a:r>
+          </a:p>
+          <a:p>
+            <a:pPr>
+              <a:lnSpc>
+                <a:spcPct val="100000"/>
+              </a:lnSpc>
+            </a:pPr>
+            <a:endParaRPr lang="pl-PL" sz="1700" spc="-1" dirty="0">
+              <a:solidFill>
+                <a:srgbClr val="000000"/>
+              </a:solidFill>
+              <a:uFill>
+                <a:solidFill>
+                  <a:srgbClr val="FFFFFF"/>
+                </a:solidFill>
+              </a:uFill>
+              <a:latin typeface="Calibri" panose="020F0502020204030204" pitchFamily="34" charset="0"/>
+              <a:ea typeface="Verdana"/>
+              <a:cs typeface="Calibri" panose="020F0502020204030204" pitchFamily="34" charset="0"/>
+            </a:endParaRPr>
+          </a:p>
+          <a:p>
+            <a:pPr marL="285750" indent="-285750">
+              <a:lnSpc>
+                <a:spcPct val="150000"/>
+              </a:lnSpc>
+              <a:buFont typeface="Arial" panose="020B0604020202020204" pitchFamily="34" charset="0"/>
+              <a:buChar char="•"/>
+            </a:pPr>
+            <a:r>
+              <a:rPr lang="pl-PL" sz="1700" spc="-1" dirty="0">
+                <a:solidFill>
+                  <a:srgbClr val="000000"/>
+                </a:solidFill>
+                <a:uFill>
+                  <a:solidFill>
+                    <a:srgbClr val="FFFFFF"/>
+                  </a:solidFill>
+                </a:uFill>
+                <a:latin typeface="Calibri" panose="020F0502020204030204" pitchFamily="34" charset="0"/>
+                <a:ea typeface="Verdana"/>
+                <a:cs typeface="Calibri" panose="020F0502020204030204" pitchFamily="34" charset="0"/>
+              </a:rPr>
+              <a:t>Android</a:t>
+            </a:r>
+          </a:p>
+          <a:p>
+            <a:pPr marL="285750" indent="-285750">
+              <a:lnSpc>
+                <a:spcPct val="150000"/>
+              </a:lnSpc>
+              <a:buFont typeface="Arial" panose="020B0604020202020204" pitchFamily="34" charset="0"/>
+              <a:buChar char="•"/>
+            </a:pPr>
+            <a:r>
+              <a:rPr lang="pl-PL" sz="1700" spc="-1" dirty="0">
+                <a:solidFill>
+                  <a:srgbClr val="000000"/>
+                </a:solidFill>
+                <a:uFill>
+                  <a:solidFill>
+                    <a:srgbClr val="FFFFFF"/>
+                  </a:solidFill>
+                </a:uFill>
+                <a:latin typeface="Calibri" panose="020F0502020204030204" pitchFamily="34" charset="0"/>
+                <a:ea typeface="Verdana"/>
+                <a:cs typeface="Calibri" panose="020F0502020204030204" pitchFamily="34" charset="0"/>
+              </a:rPr>
+              <a:t>Espresso</a:t>
+            </a:r>
+          </a:p>
+          <a:p>
+            <a:pPr marL="285750" indent="-285750">
+              <a:lnSpc>
+                <a:spcPct val="150000"/>
+              </a:lnSpc>
+              <a:buFont typeface="Arial" panose="020B0604020202020204" pitchFamily="34" charset="0"/>
+              <a:buChar char="•"/>
+            </a:pPr>
+            <a:r>
+              <a:rPr lang="pl-PL" sz="1700" spc="-1" dirty="0" err="1">
+                <a:solidFill>
+                  <a:srgbClr val="000000"/>
+                </a:solidFill>
+                <a:uFill>
+                  <a:solidFill>
+                    <a:srgbClr val="FFFFFF"/>
+                  </a:solidFill>
+                </a:uFill>
+                <a:latin typeface="Calibri" panose="020F0502020204030204" pitchFamily="34" charset="0"/>
+                <a:ea typeface="Verdana"/>
+                <a:cs typeface="Calibri" panose="020F0502020204030204" pitchFamily="34" charset="0"/>
+              </a:rPr>
+              <a:t>JUnit</a:t>
+            </a:r>
+            <a:endParaRPr lang="pl-PL" sz="1700" spc="-1" dirty="0">
+              <a:solidFill>
+                <a:srgbClr val="000000"/>
+              </a:solidFill>
+              <a:uFill>
+                <a:solidFill>
+                  <a:srgbClr val="FFFFFF"/>
+                </a:solidFill>
+              </a:uFill>
+              <a:latin typeface="Calibri" panose="020F0502020204030204" pitchFamily="34" charset="0"/>
+              <a:ea typeface="Verdana"/>
+              <a:cs typeface="Calibri" panose="020F0502020204030204" pitchFamily="34" charset="0"/>
+            </a:endParaRPr>
+          </a:p>
+          <a:p>
+            <a:pPr marL="285750" indent="-285750">
+              <a:lnSpc>
+                <a:spcPct val="150000"/>
+              </a:lnSpc>
+              <a:buFont typeface="Arial" panose="020B0604020202020204" pitchFamily="34" charset="0"/>
+              <a:buChar char="•"/>
+            </a:pPr>
+            <a:r>
+              <a:rPr lang="pl-PL" sz="1700" spc="-1" dirty="0">
+                <a:solidFill>
+                  <a:srgbClr val="000000"/>
+                </a:solidFill>
+                <a:uFill>
+                  <a:solidFill>
+                    <a:srgbClr val="FFFFFF"/>
+                  </a:solidFill>
+                </a:uFill>
+                <a:latin typeface="Calibri" panose="020F0502020204030204" pitchFamily="34" charset="0"/>
+                <a:ea typeface="Verdana"/>
+                <a:cs typeface="Calibri" panose="020F0502020204030204" pitchFamily="34" charset="0"/>
+              </a:rPr>
+              <a:t>Java</a:t>
+            </a:r>
+          </a:p>
+          <a:p>
+            <a:pPr marL="285750" indent="-285750">
+              <a:lnSpc>
+                <a:spcPct val="150000"/>
+              </a:lnSpc>
+              <a:buFont typeface="Arial" panose="020B0604020202020204" pitchFamily="34" charset="0"/>
+              <a:buChar char="•"/>
+            </a:pPr>
+            <a:r>
+              <a:rPr lang="pl-PL" sz="1700" spc="-1" dirty="0">
+                <a:solidFill>
+                  <a:srgbClr val="000000"/>
+                </a:solidFill>
+                <a:uFill>
+                  <a:solidFill>
+                    <a:srgbClr val="FFFFFF"/>
+                  </a:solidFill>
+                </a:uFill>
+                <a:latin typeface="Calibri" panose="020F0502020204030204" pitchFamily="34" charset="0"/>
+                <a:ea typeface="Verdana"/>
+                <a:cs typeface="Calibri" panose="020F0502020204030204" pitchFamily="34" charset="0"/>
+              </a:rPr>
+              <a:t>Android Studio</a:t>
+            </a:r>
+          </a:p>
+          <a:p>
+            <a:pPr>
+              <a:lnSpc>
+                <a:spcPct val="100000"/>
+              </a:lnSpc>
+            </a:pPr>
+            <a:endParaRPr lang="pl-PL" sz="1700" spc="-1" dirty="0">
+              <a:solidFill>
+                <a:srgbClr val="000000"/>
+              </a:solidFill>
+              <a:uFill>
+                <a:solidFill>
+                  <a:srgbClr val="FFFFFF"/>
+                </a:solidFill>
+              </a:uFill>
+              <a:latin typeface="Calibri" panose="020F0502020204030204" pitchFamily="34" charset="0"/>
+              <a:ea typeface="Verdana"/>
+              <a:cs typeface="Calibri" panose="020F0502020204030204" pitchFamily="34" charset="0"/>
+            </a:endParaRPr>
+          </a:p>
+        </p:txBody>
+      </p:sp>
     </p:spTree>
     <p:extLst>
       <p:ext uri="{BB962C8B-B14F-4D97-AF65-F5344CB8AC3E}">
-        <p14:creationId xmlns:p14="http://schemas.microsoft.com/office/powerpoint/2010/main" val="2294709877"/>
+        <p14:creationId xmlns:p14="http://schemas.microsoft.com/office/powerpoint/2010/main" val="2083186259"/>
       </p:ext>
     </p:extLst>
   </p:cSld>

</xml_diff>